<commit_message>
Update documentation for acceptance
</commit_message>
<xml_diff>
--- a/documentation/Proposal/Scope.pptx
+++ b/documentation/Proposal/Scope.pptx
@@ -243,7 +243,7 @@
           <a:p>
             <a:fld id="{FD6A7C92-89EB-41CA-A266-33FCC434B0E1}" type="datetimeFigureOut">
               <a:rPr lang="en-SG" smtClean="0"/>
-              <a:t>19/10/2016</a:t>
+              <a:t>03/11/2016</a:t>
             </a:fld>
             <a:endParaRPr lang="en-SG"/>
           </a:p>
@@ -413,7 +413,7 @@
           <a:p>
             <a:fld id="{FD6A7C92-89EB-41CA-A266-33FCC434B0E1}" type="datetimeFigureOut">
               <a:rPr lang="en-SG" smtClean="0"/>
-              <a:t>19/10/2016</a:t>
+              <a:t>03/11/2016</a:t>
             </a:fld>
             <a:endParaRPr lang="en-SG"/>
           </a:p>
@@ -593,7 +593,7 @@
           <a:p>
             <a:fld id="{FD6A7C92-89EB-41CA-A266-33FCC434B0E1}" type="datetimeFigureOut">
               <a:rPr lang="en-SG" smtClean="0"/>
-              <a:t>19/10/2016</a:t>
+              <a:t>03/11/2016</a:t>
             </a:fld>
             <a:endParaRPr lang="en-SG"/>
           </a:p>
@@ -763,7 +763,7 @@
           <a:p>
             <a:fld id="{FD6A7C92-89EB-41CA-A266-33FCC434B0E1}" type="datetimeFigureOut">
               <a:rPr lang="en-SG" smtClean="0"/>
-              <a:t>19/10/2016</a:t>
+              <a:t>03/11/2016</a:t>
             </a:fld>
             <a:endParaRPr lang="en-SG"/>
           </a:p>
@@ -1009,7 +1009,7 @@
           <a:p>
             <a:fld id="{FD6A7C92-89EB-41CA-A266-33FCC434B0E1}" type="datetimeFigureOut">
               <a:rPr lang="en-SG" smtClean="0"/>
-              <a:t>19/10/2016</a:t>
+              <a:t>03/11/2016</a:t>
             </a:fld>
             <a:endParaRPr lang="en-SG"/>
           </a:p>
@@ -1241,7 +1241,7 @@
           <a:p>
             <a:fld id="{FD6A7C92-89EB-41CA-A266-33FCC434B0E1}" type="datetimeFigureOut">
               <a:rPr lang="en-SG" smtClean="0"/>
-              <a:t>19/10/2016</a:t>
+              <a:t>03/11/2016</a:t>
             </a:fld>
             <a:endParaRPr lang="en-SG"/>
           </a:p>
@@ -1608,7 +1608,7 @@
           <a:p>
             <a:fld id="{FD6A7C92-89EB-41CA-A266-33FCC434B0E1}" type="datetimeFigureOut">
               <a:rPr lang="en-SG" smtClean="0"/>
-              <a:t>19/10/2016</a:t>
+              <a:t>03/11/2016</a:t>
             </a:fld>
             <a:endParaRPr lang="en-SG"/>
           </a:p>
@@ -1726,7 +1726,7 @@
           <a:p>
             <a:fld id="{FD6A7C92-89EB-41CA-A266-33FCC434B0E1}" type="datetimeFigureOut">
               <a:rPr lang="en-SG" smtClean="0"/>
-              <a:t>19/10/2016</a:t>
+              <a:t>03/11/2016</a:t>
             </a:fld>
             <a:endParaRPr lang="en-SG"/>
           </a:p>
@@ -1821,7 +1821,7 @@
           <a:p>
             <a:fld id="{FD6A7C92-89EB-41CA-A266-33FCC434B0E1}" type="datetimeFigureOut">
               <a:rPr lang="en-SG" smtClean="0"/>
-              <a:t>19/10/2016</a:t>
+              <a:t>03/11/2016</a:t>
             </a:fld>
             <a:endParaRPr lang="en-SG"/>
           </a:p>
@@ -2098,7 +2098,7 @@
           <a:p>
             <a:fld id="{FD6A7C92-89EB-41CA-A266-33FCC434B0E1}" type="datetimeFigureOut">
               <a:rPr lang="en-SG" smtClean="0"/>
-              <a:t>19/10/2016</a:t>
+              <a:t>03/11/2016</a:t>
             </a:fld>
             <a:endParaRPr lang="en-SG"/>
           </a:p>
@@ -2355,7 +2355,7 @@
           <a:p>
             <a:fld id="{FD6A7C92-89EB-41CA-A266-33FCC434B0E1}" type="datetimeFigureOut">
               <a:rPr lang="en-SG" smtClean="0"/>
-              <a:t>19/10/2016</a:t>
+              <a:t>03/11/2016</a:t>
             </a:fld>
             <a:endParaRPr lang="en-SG"/>
           </a:p>
@@ -2568,7 +2568,7 @@
           <a:p>
             <a:fld id="{FD6A7C92-89EB-41CA-A266-33FCC434B0E1}" type="datetimeFigureOut">
               <a:rPr lang="en-SG" smtClean="0"/>
-              <a:t>19/10/2016</a:t>
+              <a:t>03/11/2016</a:t>
             </a:fld>
             <a:endParaRPr lang="en-SG"/>
           </a:p>
@@ -3182,7 +3182,7 @@
           <a:lstStyle/>
           <a:p>
             <a:r>
-              <a:rPr lang="en-SG" b="1" dirty="0">
+              <a:rPr lang="en-SG" b="1" u="sng" dirty="0">
                 <a:solidFill>
                   <a:schemeClr val="bg1"/>
                 </a:solidFill>
@@ -3196,7 +3196,7 @@
               <a:buChar char="•"/>
             </a:pPr>
             <a:r>
-              <a:rPr lang="en-SG" dirty="0">
+              <a:rPr lang="en-SG" u="sng" dirty="0">
                 <a:solidFill>
                   <a:schemeClr val="bg1"/>
                 </a:solidFill>
@@ -3222,7 +3222,7 @@
         <p:spPr>
           <a:xfrm>
             <a:off x="6480581" y="1968227"/>
-            <a:ext cx="2487008" cy="2308324"/>
+            <a:ext cx="2487008" cy="3139321"/>
           </a:xfrm>
           <a:prstGeom prst="rect">
             <a:avLst/>
@@ -3255,7 +3255,7 @@
                   <a:schemeClr val="bg1"/>
                 </a:solidFill>
               </a:rPr>
-              <a:t>Visitor Registration</a:t>
+              <a:t>Visitor Online Registration</a:t>
             </a:r>
           </a:p>
           <a:p>
@@ -3269,7 +3269,7 @@
                   <a:schemeClr val="bg1"/>
                 </a:solidFill>
               </a:rPr>
-              <a:t>Visitor Screening Questionnaire</a:t>
+              <a:t>Visitor Assisted Registration</a:t>
             </a:r>
           </a:p>
           <a:p>
@@ -3283,7 +3283,7 @@
                   <a:schemeClr val="bg1"/>
                 </a:solidFill>
               </a:rPr>
-              <a:t>Visitor Sign-in &amp; Validation</a:t>
+              <a:t>Visitor Screening and ‘Sign-in’ at Hospital (Entrance)</a:t>
             </a:r>
           </a:p>
           <a:p>
@@ -3297,7 +3297,7 @@
                   <a:schemeClr val="bg1"/>
                 </a:solidFill>
               </a:rPr>
-              <a:t>Visitor Checkpoint Sign-in</a:t>
+              <a:t>Visitor Checkpoint check-ins (within Hospital)</a:t>
             </a:r>
           </a:p>
         </p:txBody>
@@ -3422,9 +3422,9 @@
           <a:lstStyle/>
           <a:p>
             <a:r>
-              <a:rPr lang="en-SG" b="1" dirty="0">
-                <a:solidFill>
-                  <a:schemeClr val="bg2"/>
+              <a:rPr lang="en-SG" b="1" u="sng" dirty="0">
+                <a:solidFill>
+                  <a:schemeClr val="bg1"/>
                 </a:solidFill>
               </a:rPr>
               <a:t>Content Customization Module</a:t>
@@ -3436,9 +3436,9 @@
               <a:buChar char="•"/>
             </a:pPr>
             <a:r>
-              <a:rPr lang="en-SG" dirty="0">
-                <a:solidFill>
-                  <a:schemeClr val="bg2"/>
+              <a:rPr lang="en-SG" b="1" u="sng" dirty="0">
+                <a:solidFill>
+                  <a:schemeClr val="bg1"/>
                 </a:solidFill>
               </a:rPr>
               <a:t>Visitor Registration Form</a:t>
@@ -3450,9 +3450,9 @@
               <a:buChar char="•"/>
             </a:pPr>
             <a:r>
-              <a:rPr lang="en-SG" dirty="0">
-                <a:solidFill>
-                  <a:schemeClr val="bg2"/>
+              <a:rPr lang="en-SG" b="1" u="sng" dirty="0">
+                <a:solidFill>
+                  <a:schemeClr val="bg1"/>
                 </a:solidFill>
               </a:rPr>
               <a:t>Visitor Screening Questionnaire</a:t>
@@ -3475,8 +3475,8 @@
         </p:nvSpPr>
         <p:spPr>
           <a:xfrm>
-            <a:off x="6588725" y="5273089"/>
-            <a:ext cx="2111202" cy="646331"/>
+            <a:off x="6320970" y="6085238"/>
+            <a:ext cx="2111202" cy="923330"/>
           </a:xfrm>
           <a:prstGeom prst="rect">
             <a:avLst/>
@@ -3509,7 +3509,7 @@
                   <a:schemeClr val="bg1"/>
                 </a:solidFill>
               </a:rPr>
-              <a:t>Visitor Sign-Out</a:t>
+              <a:t>Visitor ‘Sign-Out’ (Exit)</a:t>
             </a:r>
           </a:p>
         </p:txBody>
@@ -3786,7 +3786,7 @@
         </p:nvSpPr>
         <p:spPr>
           <a:xfrm>
-            <a:off x="6583679" y="4353112"/>
+            <a:off x="6576691" y="5119406"/>
             <a:ext cx="2612300" cy="923330"/>
           </a:xfrm>
           <a:prstGeom prst="rect">
@@ -3854,7 +3854,9 @@
             <a:r>
               <a:rPr lang="en-SG" b="1" dirty="0">
                 <a:solidFill>
-                  <a:schemeClr val="bg1"/>
+                  <a:schemeClr val="accent5">
+                    <a:lumMod val="75000"/>
+                  </a:schemeClr>
                 </a:solidFill>
               </a:rPr>
               <a:t>Facilities Management</a:t>
@@ -3868,7 +3870,9 @@
             <a:r>
               <a:rPr lang="en-SG" dirty="0">
                 <a:solidFill>
-                  <a:schemeClr val="bg1"/>
+                  <a:schemeClr val="accent5">
+                    <a:lumMod val="75000"/>
+                  </a:schemeClr>
                 </a:solidFill>
               </a:rPr>
               <a:t>Add/Update/Delete Wards, Wings, Cubicles and Beds</a:t>
@@ -3882,7 +3886,9 @@
             <a:r>
               <a:rPr lang="en-SG" dirty="0">
                 <a:solidFill>
-                  <a:schemeClr val="bg1"/>
+                  <a:schemeClr val="accent5">
+                    <a:lumMod val="75000"/>
+                  </a:schemeClr>
                 </a:solidFill>
               </a:rPr>
               <a:t>Visit Time Configuration</a:t>
@@ -3922,7 +3928,9 @@
             <a:r>
               <a:rPr lang="en-SG" b="1" dirty="0">
                 <a:solidFill>
-                  <a:schemeClr val="bg1"/>
+                  <a:schemeClr val="accent5">
+                    <a:lumMod val="75000"/>
+                  </a:schemeClr>
                 </a:solidFill>
               </a:rPr>
               <a:t>Pass Management</a:t>
@@ -3936,7 +3944,9 @@
             <a:r>
               <a:rPr lang="en-SG" dirty="0">
                 <a:solidFill>
-                  <a:schemeClr val="bg1"/>
+                  <a:schemeClr val="accent5">
+                    <a:lumMod val="75000"/>
+                  </a:schemeClr>
                 </a:solidFill>
               </a:rPr>
               <a:t>Visitor Pass Template Creation/Update</a:t>

</xml_diff>